<commit_message>
#91: reworks and renames MinioBlobClient, adds
... findToArchive for DocBlobClient
</commit_message>
<xml_diff>
--- a/modules/lib/minio/src/main/asciidoc/resources/design-sketch.pptx
+++ b/modules/lib/minio/src/main/asciidoc/resources/design-sketch.pptx
@@ -261,7 +261,7 @@
           <a:p>
             <a:fld id="{4ABBF570-B5A3-4C1B-9C5A-286BC455873B}" type="datetimeFigureOut">
               <a:rPr lang="en-GB" smtClean="0"/>
-              <a:t>23/07/2018</a:t>
+              <a:t>24/07/2018</a:t>
             </a:fld>
             <a:endParaRPr lang="en-GB"/>
           </a:p>
@@ -461,7 +461,7 @@
           <a:p>
             <a:fld id="{4ABBF570-B5A3-4C1B-9C5A-286BC455873B}" type="datetimeFigureOut">
               <a:rPr lang="en-GB" smtClean="0"/>
-              <a:t>23/07/2018</a:t>
+              <a:t>24/07/2018</a:t>
             </a:fld>
             <a:endParaRPr lang="en-GB"/>
           </a:p>
@@ -671,7 +671,7 @@
           <a:p>
             <a:fld id="{4ABBF570-B5A3-4C1B-9C5A-286BC455873B}" type="datetimeFigureOut">
               <a:rPr lang="en-GB" smtClean="0"/>
-              <a:t>23/07/2018</a:t>
+              <a:t>24/07/2018</a:t>
             </a:fld>
             <a:endParaRPr lang="en-GB"/>
           </a:p>
@@ -871,7 +871,7 @@
           <a:p>
             <a:fld id="{4ABBF570-B5A3-4C1B-9C5A-286BC455873B}" type="datetimeFigureOut">
               <a:rPr lang="en-GB" smtClean="0"/>
-              <a:t>23/07/2018</a:t>
+              <a:t>24/07/2018</a:t>
             </a:fld>
             <a:endParaRPr lang="en-GB"/>
           </a:p>
@@ -1147,7 +1147,7 @@
           <a:p>
             <a:fld id="{4ABBF570-B5A3-4C1B-9C5A-286BC455873B}" type="datetimeFigureOut">
               <a:rPr lang="en-GB" smtClean="0"/>
-              <a:t>23/07/2018</a:t>
+              <a:t>24/07/2018</a:t>
             </a:fld>
             <a:endParaRPr lang="en-GB"/>
           </a:p>
@@ -1415,7 +1415,7 @@
           <a:p>
             <a:fld id="{4ABBF570-B5A3-4C1B-9C5A-286BC455873B}" type="datetimeFigureOut">
               <a:rPr lang="en-GB" smtClean="0"/>
-              <a:t>23/07/2018</a:t>
+              <a:t>24/07/2018</a:t>
             </a:fld>
             <a:endParaRPr lang="en-GB"/>
           </a:p>
@@ -1830,7 +1830,7 @@
           <a:p>
             <a:fld id="{4ABBF570-B5A3-4C1B-9C5A-286BC455873B}" type="datetimeFigureOut">
               <a:rPr lang="en-GB" smtClean="0"/>
-              <a:t>23/07/2018</a:t>
+              <a:t>24/07/2018</a:t>
             </a:fld>
             <a:endParaRPr lang="en-GB"/>
           </a:p>
@@ -1972,7 +1972,7 @@
           <a:p>
             <a:fld id="{4ABBF570-B5A3-4C1B-9C5A-286BC455873B}" type="datetimeFigureOut">
               <a:rPr lang="en-GB" smtClean="0"/>
-              <a:t>23/07/2018</a:t>
+              <a:t>24/07/2018</a:t>
             </a:fld>
             <a:endParaRPr lang="en-GB"/>
           </a:p>
@@ -2085,7 +2085,7 @@
           <a:p>
             <a:fld id="{4ABBF570-B5A3-4C1B-9C5A-286BC455873B}" type="datetimeFigureOut">
               <a:rPr lang="en-GB" smtClean="0"/>
-              <a:t>23/07/2018</a:t>
+              <a:t>24/07/2018</a:t>
             </a:fld>
             <a:endParaRPr lang="en-GB"/>
           </a:p>
@@ -2398,7 +2398,7 @@
           <a:p>
             <a:fld id="{4ABBF570-B5A3-4C1B-9C5A-286BC455873B}" type="datetimeFigureOut">
               <a:rPr lang="en-GB" smtClean="0"/>
-              <a:t>23/07/2018</a:t>
+              <a:t>24/07/2018</a:t>
             </a:fld>
             <a:endParaRPr lang="en-GB"/>
           </a:p>
@@ -2687,7 +2687,7 @@
           <a:p>
             <a:fld id="{4ABBF570-B5A3-4C1B-9C5A-286BC455873B}" type="datetimeFigureOut">
               <a:rPr lang="en-GB" smtClean="0"/>
-              <a:t>23/07/2018</a:t>
+              <a:t>24/07/2018</a:t>
             </a:fld>
             <a:endParaRPr lang="en-GB"/>
           </a:p>
@@ -2930,7 +2930,7 @@
           <a:p>
             <a:fld id="{4ABBF570-B5A3-4C1B-9C5A-286BC455873B}" type="datetimeFigureOut">
               <a:rPr lang="en-GB" smtClean="0"/>
-              <a:t>23/07/2018</a:t>
+              <a:t>24/07/2018</a:t>
             </a:fld>
             <a:endParaRPr lang="en-GB"/>
           </a:p>
@@ -3361,8 +3361,8 @@
         </p:nvSpPr>
         <p:spPr>
           <a:xfrm>
-            <a:off x="1424193" y="3344564"/>
-            <a:ext cx="7969794" cy="3262292"/>
+            <a:off x="1424193" y="3547230"/>
+            <a:ext cx="7969794" cy="3059626"/>
           </a:xfrm>
           <a:prstGeom prst="rect">
             <a:avLst/>
@@ -3461,8 +3461,8 @@
         </p:nvSpPr>
         <p:spPr>
           <a:xfrm>
-            <a:off x="240957" y="932933"/>
-            <a:ext cx="2022390" cy="1105931"/>
+            <a:off x="628008" y="1021893"/>
+            <a:ext cx="2022390" cy="1648912"/>
           </a:xfrm>
           <a:prstGeom prst="rect">
             <a:avLst/>
@@ -3483,7 +3483,7 @@
           </a:fontRef>
         </p:style>
         <p:txBody>
-          <a:bodyPr rtlCol="0" anchor="ctr"/>
+          <a:bodyPr rtlCol="0" anchor="t" anchorCtr="0"/>
           <a:lstStyle/>
           <a:p>
             <a:pPr algn="ctr"/>
@@ -3509,8 +3509,8 @@
         </p:nvSpPr>
         <p:spPr>
           <a:xfrm>
-            <a:off x="7292547" y="978242"/>
-            <a:ext cx="2022390" cy="1105931"/>
+            <a:off x="7292546" y="1119524"/>
+            <a:ext cx="2802923" cy="1885658"/>
           </a:xfrm>
           <a:prstGeom prst="rect">
             <a:avLst/>
@@ -3531,17 +3531,17 @@
           </a:fontRef>
         </p:style>
         <p:txBody>
-          <a:bodyPr rtlCol="0" anchor="ctr"/>
-          <a:lstStyle/>
-          <a:p>
-            <a:pPr algn="ctr"/>
+          <a:bodyPr rtlCol="0" anchor="t" anchorCtr="0"/>
+          <a:lstStyle/>
+          <a:p>
+            <a:pPr algn="r"/>
             <a:r>
               <a:rPr lang="en-GB" dirty="0"/>
               <a:t>Estatio</a:t>
             </a:r>
           </a:p>
           <a:p>
-            <a:pPr algn="ctr"/>
+            <a:pPr algn="r"/>
             <a:endParaRPr lang="en-GB" dirty="0"/>
           </a:p>
         </p:txBody>
@@ -3560,7 +3560,7 @@
         </p:nvSpPr>
         <p:spPr>
           <a:xfrm>
-            <a:off x="798041" y="111209"/>
+            <a:off x="1185092" y="200169"/>
             <a:ext cx="908222" cy="654908"/>
           </a:xfrm>
           <a:prstGeom prst="flowChartMagneticDisk">
@@ -3604,7 +3604,7 @@
         </p:nvSpPr>
         <p:spPr>
           <a:xfrm>
-            <a:off x="7923771" y="98855"/>
+            <a:off x="8188660" y="258743"/>
             <a:ext cx="908222" cy="654908"/>
           </a:xfrm>
           <a:prstGeom prst="flowChartMagneticDisk">
@@ -3648,8 +3648,8 @@
         </p:nvSpPr>
         <p:spPr>
           <a:xfrm>
-            <a:off x="7292546" y="1750541"/>
-            <a:ext cx="2022389" cy="333632"/>
+            <a:off x="7292546" y="2671550"/>
+            <a:ext cx="2022390" cy="333632"/>
           </a:xfrm>
           <a:prstGeom prst="rect">
             <a:avLst/>
@@ -3675,9 +3675,10 @@
           <a:p>
             <a:pPr algn="ctr"/>
             <a:r>
-              <a:rPr lang="en-GB" dirty="0"/>
-              <a:t>Doc Server (REST)</a:t>
-            </a:r>
+              <a:rPr lang="en-GB" dirty="0" err="1"/>
+              <a:t>DocBlobService</a:t>
+            </a:r>
+            <a:endParaRPr lang="en-GB" dirty="0"/>
           </a:p>
         </p:txBody>
       </p:sp>
@@ -3769,8 +3770,12 @@
           <a:p>
             <a:pPr algn="ctr"/>
             <a:r>
+              <a:rPr lang="en-GB" dirty="0" err="1"/>
+              <a:t>MinioBlob</a:t>
+            </a:r>
+            <a:r>
               <a:rPr lang="en-GB" dirty="0"/>
-              <a:t>Blob Client</a:t>
+              <a:t> Client</a:t>
             </a:r>
           </a:p>
         </p:txBody>
@@ -3816,8 +3821,15 @@
           <a:p>
             <a:pPr algn="ctr"/>
             <a:r>
+              <a:rPr lang="en-GB" dirty="0" err="1"/>
+              <a:t>DocBlob</a:t>
+            </a:r>
+            <a:br>
               <a:rPr lang="en-GB" dirty="0"/>
-              <a:t>Doc Client</a:t>
+            </a:br>
+            <a:r>
+              <a:rPr lang="en-GB" dirty="0"/>
+              <a:t>Client</a:t>
             </a:r>
           </a:p>
         </p:txBody>
@@ -3882,8 +3894,8 @@
         </p:nvCxnSpPr>
         <p:spPr>
           <a:xfrm rot="5400000" flipH="1" flipV="1">
-            <a:off x="5434388" y="2012407"/>
-            <a:ext cx="1953207" cy="1763109"/>
+            <a:off x="5894892" y="2472911"/>
+            <a:ext cx="1032198" cy="1763109"/>
           </a:xfrm>
           <a:prstGeom prst="curvedConnector2">
             <a:avLst/>
@@ -4126,8 +4138,8 @@
         </p:nvSpPr>
         <p:spPr>
           <a:xfrm>
-            <a:off x="5879543" y="2856986"/>
-            <a:ext cx="814518" cy="276999"/>
+            <a:off x="4922937" y="2856986"/>
+            <a:ext cx="1284582" cy="276999"/>
           </a:xfrm>
           <a:prstGeom prst="rect">
             <a:avLst/>
@@ -4146,9 +4158,12 @@
             </a:r>
             <a:r>
               <a:rPr lang="en-GB" sz="1200" dirty="0" err="1"/>
-              <a:t>fetchAll</a:t>
-            </a:r>
-            <a:endParaRPr lang="en-GB" sz="1200" dirty="0"/>
+              <a:t>findToArchive</a:t>
+            </a:r>
+            <a:r>
+              <a:rPr lang="en-GB" sz="1200" dirty="0"/>
+              <a:t>()</a:t>
+            </a:r>
           </a:p>
         </p:txBody>
       </p:sp>
@@ -4205,8 +4220,8 @@
         </p:nvCxnSpPr>
         <p:spPr>
           <a:xfrm rot="16200000" flipV="1">
-            <a:off x="1029229" y="2261788"/>
-            <a:ext cx="1858661" cy="1412814"/>
+            <a:off x="1538725" y="2771283"/>
+            <a:ext cx="1226720" cy="1025763"/>
           </a:xfrm>
           <a:prstGeom prst="curvedConnector3">
             <a:avLst>
@@ -4246,7 +4261,7 @@
         </p:nvSpPr>
         <p:spPr>
           <a:xfrm>
-            <a:off x="2044590" y="2941112"/>
+            <a:off x="1960182" y="2941112"/>
             <a:ext cx="1536874" cy="276999"/>
           </a:xfrm>
           <a:prstGeom prst="rect">
@@ -4293,8 +4308,8 @@
         </p:nvCxnSpPr>
         <p:spPr>
           <a:xfrm flipV="1">
-            <a:off x="6286803" y="2084173"/>
-            <a:ext cx="2016938" cy="2155035"/>
+            <a:off x="6286803" y="3005182"/>
+            <a:ext cx="2016938" cy="1234026"/>
           </a:xfrm>
           <a:prstGeom prst="curvedConnector2">
             <a:avLst/>
@@ -4332,8 +4347,8 @@
         </p:nvSpPr>
         <p:spPr>
           <a:xfrm>
-            <a:off x="7020695" y="3793944"/>
-            <a:ext cx="1074461" cy="276999"/>
+            <a:off x="7456796" y="3908732"/>
+            <a:ext cx="1085041" cy="276999"/>
           </a:xfrm>
           <a:prstGeom prst="rect">
             <a:avLst/>
@@ -4348,7 +4363,7 @@
           <a:p>
             <a:r>
               <a:rPr lang="en-GB" sz="1200" dirty="0"/>
-              <a:t>7: update (</a:t>
+              <a:t>7: archive (</a:t>
             </a:r>
             <a:r>
               <a:rPr lang="en-GB" sz="1200" dirty="0" err="1"/>
@@ -4504,8 +4519,8 @@
         </p:nvCxnSpPr>
         <p:spPr>
           <a:xfrm rot="16200000" flipV="1">
-            <a:off x="9164595" y="1681550"/>
-            <a:ext cx="1970712" cy="1670028"/>
+            <a:off x="9820434" y="2337389"/>
+            <a:ext cx="1439567" cy="889496"/>
           </a:xfrm>
           <a:prstGeom prst="curvedConnector2">
             <a:avLst/>
@@ -4547,8 +4562,8 @@
         </p:nvCxnSpPr>
         <p:spPr>
           <a:xfrm rot="10800000">
-            <a:off x="2263347" y="1485900"/>
-            <a:ext cx="5029200" cy="45309"/>
+            <a:off x="2650398" y="1846349"/>
+            <a:ext cx="4642148" cy="216004"/>
           </a:xfrm>
           <a:prstGeom prst="curvedConnector3">
             <a:avLst>
@@ -4629,7 +4644,7 @@
         </p:nvSpPr>
         <p:spPr>
           <a:xfrm>
-            <a:off x="4839865" y="1279436"/>
+            <a:off x="4839865" y="1680366"/>
             <a:ext cx="263214" cy="276999"/>
           </a:xfrm>
           <a:prstGeom prst="rect">
@@ -4650,6 +4665,266 @@
           </a:p>
         </p:txBody>
       </p:sp>
+      <p:sp>
+        <p:nvSpPr>
+          <p:cNvPr id="34" name="Rectangle 33">
+            <a:extLst>
+              <a:ext uri="{FF2B5EF4-FFF2-40B4-BE49-F238E27FC236}">
+                <a16:creationId xmlns:a16="http://schemas.microsoft.com/office/drawing/2014/main" id="{91D59E44-1150-4975-B615-F28806392DD0}"/>
+              </a:ext>
+            </a:extLst>
+          </p:cNvPr>
+          <p:cNvSpPr/>
+          <p:nvPr/>
+        </p:nvSpPr>
+        <p:spPr>
+          <a:xfrm>
+            <a:off x="7372639" y="1912902"/>
+            <a:ext cx="1266055" cy="638375"/>
+          </a:xfrm>
+          <a:prstGeom prst="rect">
+            <a:avLst/>
+          </a:prstGeom>
+        </p:spPr>
+        <p:style>
+          <a:lnRef idx="2">
+            <a:schemeClr val="accent1"/>
+          </a:lnRef>
+          <a:fillRef idx="1">
+            <a:schemeClr val="lt1"/>
+          </a:fillRef>
+          <a:effectRef idx="0">
+            <a:schemeClr val="accent1"/>
+          </a:effectRef>
+          <a:fontRef idx="minor">
+            <a:schemeClr val="dk1"/>
+          </a:fontRef>
+        </p:style>
+        <p:txBody>
+          <a:bodyPr rtlCol="0" anchor="ctr"/>
+          <a:lstStyle/>
+          <a:p>
+            <a:pPr algn="ctr"/>
+            <a:r>
+              <a:rPr lang="en-GB" sz="900" dirty="0"/>
+              <a:t>&lt;&lt;</a:t>
+            </a:r>
+            <a:r>
+              <a:rPr lang="en-GB" sz="900" dirty="0" err="1"/>
+              <a:t>spi</a:t>
+            </a:r>
+            <a:r>
+              <a:rPr lang="en-GB" sz="900" dirty="0"/>
+              <a:t>&gt;&gt;</a:t>
+            </a:r>
+            <a:br>
+              <a:rPr lang="en-GB" sz="900" dirty="0"/>
+            </a:br>
+            <a:r>
+              <a:rPr lang="en-GB" sz="1400" dirty="0" err="1"/>
+              <a:t>DocBlob</a:t>
+            </a:r>
+            <a:br>
+              <a:rPr lang="en-GB" sz="1400" dirty="0"/>
+            </a:br>
+            <a:r>
+              <a:rPr lang="en-GB" sz="1400" dirty="0" err="1"/>
+              <a:t>ServiceBridge</a:t>
+            </a:r>
+            <a:endParaRPr lang="en-GB" sz="1400" dirty="0"/>
+          </a:p>
+        </p:txBody>
+      </p:sp>
+      <p:sp>
+        <p:nvSpPr>
+          <p:cNvPr id="43" name="Rectangle 42">
+            <a:extLst>
+              <a:ext uri="{FF2B5EF4-FFF2-40B4-BE49-F238E27FC236}">
+                <a16:creationId xmlns:a16="http://schemas.microsoft.com/office/drawing/2014/main" id="{CA633A96-204D-42A9-B746-D412D646815F}"/>
+              </a:ext>
+            </a:extLst>
+          </p:cNvPr>
+          <p:cNvSpPr/>
+          <p:nvPr/>
+        </p:nvSpPr>
+        <p:spPr>
+          <a:xfrm>
+            <a:off x="7372639" y="1235285"/>
+            <a:ext cx="1266055" cy="548411"/>
+          </a:xfrm>
+          <a:prstGeom prst="rect">
+            <a:avLst/>
+          </a:prstGeom>
+        </p:spPr>
+        <p:style>
+          <a:lnRef idx="2">
+            <a:schemeClr val="accent1"/>
+          </a:lnRef>
+          <a:fillRef idx="1">
+            <a:schemeClr val="lt1"/>
+          </a:fillRef>
+          <a:effectRef idx="0">
+            <a:schemeClr val="accent1"/>
+          </a:effectRef>
+          <a:fontRef idx="minor">
+            <a:schemeClr val="dk1"/>
+          </a:fontRef>
+        </p:style>
+        <p:txBody>
+          <a:bodyPr rtlCol="0" anchor="ctr"/>
+          <a:lstStyle/>
+          <a:p>
+            <a:pPr algn="ctr"/>
+            <a:r>
+              <a:rPr lang="en-GB" sz="1400" dirty="0"/>
+              <a:t>Document</a:t>
+            </a:r>
+            <a:br>
+              <a:rPr lang="en-GB" sz="1400" dirty="0"/>
+            </a:br>
+            <a:r>
+              <a:rPr lang="en-GB" sz="1400" dirty="0"/>
+              <a:t>Repository</a:t>
+            </a:r>
+            <a:endParaRPr lang="en-GB" sz="2800" dirty="0"/>
+          </a:p>
+        </p:txBody>
+      </p:sp>
+      <p:cxnSp>
+        <p:nvCxnSpPr>
+          <p:cNvPr id="45" name="Connector: Curved 44">
+            <a:extLst>
+              <a:ext uri="{FF2B5EF4-FFF2-40B4-BE49-F238E27FC236}">
+                <a16:creationId xmlns:a16="http://schemas.microsoft.com/office/drawing/2014/main" id="{A2671F23-6090-4213-A66E-66F42E1B1D8C}"/>
+              </a:ext>
+            </a:extLst>
+          </p:cNvPr>
+          <p:cNvCxnSpPr>
+            <a:cxnSpLocks/>
+            <a:stCxn id="8" idx="0"/>
+            <a:endCxn id="34" idx="2"/>
+          </p:cNvCxnSpPr>
+          <p:nvPr/>
+        </p:nvCxnSpPr>
+        <p:spPr>
+          <a:xfrm rot="16200000" flipV="1">
+            <a:off x="8094568" y="2462377"/>
+            <a:ext cx="120273" cy="298074"/>
+          </a:xfrm>
+          <a:prstGeom prst="curvedConnector3">
+            <a:avLst>
+              <a:gd name="adj1" fmla="val 50000"/>
+            </a:avLst>
+          </a:prstGeom>
+          <a:ln>
+            <a:tailEnd type="triangle"/>
+          </a:ln>
+        </p:spPr>
+        <p:style>
+          <a:lnRef idx="1">
+            <a:schemeClr val="accent1"/>
+          </a:lnRef>
+          <a:fillRef idx="0">
+            <a:schemeClr val="accent1"/>
+          </a:fillRef>
+          <a:effectRef idx="0">
+            <a:schemeClr val="accent1"/>
+          </a:effectRef>
+          <a:fontRef idx="minor">
+            <a:schemeClr val="tx1"/>
+          </a:fontRef>
+        </p:style>
+      </p:cxnSp>
+      <p:cxnSp>
+        <p:nvCxnSpPr>
+          <p:cNvPr id="48" name="Connector: Curved 47">
+            <a:extLst>
+              <a:ext uri="{FF2B5EF4-FFF2-40B4-BE49-F238E27FC236}">
+                <a16:creationId xmlns:a16="http://schemas.microsoft.com/office/drawing/2014/main" id="{255451DB-2B51-48EE-8866-7499F82B75DE}"/>
+              </a:ext>
+            </a:extLst>
+          </p:cNvPr>
+          <p:cNvCxnSpPr>
+            <a:cxnSpLocks/>
+            <a:stCxn id="34" idx="0"/>
+            <a:endCxn id="43" idx="2"/>
+          </p:cNvCxnSpPr>
+          <p:nvPr/>
+        </p:nvCxnSpPr>
+        <p:spPr>
+          <a:xfrm rot="5400000" flipH="1" flipV="1">
+            <a:off x="7941064" y="1848299"/>
+            <a:ext cx="129206" cy="12700"/>
+          </a:xfrm>
+          <a:prstGeom prst="curvedConnector3">
+            <a:avLst>
+              <a:gd name="adj1" fmla="val 50000"/>
+            </a:avLst>
+          </a:prstGeom>
+          <a:ln>
+            <a:tailEnd type="triangle"/>
+          </a:ln>
+        </p:spPr>
+        <p:style>
+          <a:lnRef idx="1">
+            <a:schemeClr val="accent1"/>
+          </a:lnRef>
+          <a:fillRef idx="0">
+            <a:schemeClr val="accent1"/>
+          </a:fillRef>
+          <a:effectRef idx="0">
+            <a:schemeClr val="accent1"/>
+          </a:effectRef>
+          <a:fontRef idx="minor">
+            <a:schemeClr val="tx1"/>
+          </a:fontRef>
+        </p:style>
+      </p:cxnSp>
+      <p:cxnSp>
+        <p:nvCxnSpPr>
+          <p:cNvPr id="54" name="Connector: Curved 53">
+            <a:extLst>
+              <a:ext uri="{FF2B5EF4-FFF2-40B4-BE49-F238E27FC236}">
+                <a16:creationId xmlns:a16="http://schemas.microsoft.com/office/drawing/2014/main" id="{923C738C-182F-446F-8C88-D828C7EFFCC0}"/>
+              </a:ext>
+            </a:extLst>
+          </p:cNvPr>
+          <p:cNvCxnSpPr>
+            <a:cxnSpLocks/>
+            <a:stCxn id="43" idx="0"/>
+            <a:endCxn id="7" idx="3"/>
+          </p:cNvCxnSpPr>
+          <p:nvPr/>
+        </p:nvCxnSpPr>
+        <p:spPr>
+          <a:xfrm rot="5400000" flipH="1" flipV="1">
+            <a:off x="8163402" y="755916"/>
+            <a:ext cx="321634" cy="637104"/>
+          </a:xfrm>
+          <a:prstGeom prst="curvedConnector3">
+            <a:avLst>
+              <a:gd name="adj1" fmla="val 50000"/>
+            </a:avLst>
+          </a:prstGeom>
+          <a:ln>
+            <a:tailEnd type="triangle"/>
+          </a:ln>
+        </p:spPr>
+        <p:style>
+          <a:lnRef idx="1">
+            <a:schemeClr val="accent1"/>
+          </a:lnRef>
+          <a:fillRef idx="0">
+            <a:schemeClr val="accent1"/>
+          </a:fillRef>
+          <a:effectRef idx="0">
+            <a:schemeClr val="accent1"/>
+          </a:effectRef>
+          <a:fontRef idx="minor">
+            <a:schemeClr val="tx1"/>
+          </a:fontRef>
+        </p:style>
+      </p:cxnSp>
     </p:spTree>
     <p:extLst>
       <p:ext uri="{BB962C8B-B14F-4D97-AF65-F5344CB8AC3E}">

</xml_diff>

<commit_message>
#91 - adds MinioArchiver library and MinoiArchiver tool (Main)
</commit_message>
<xml_diff>
--- a/modules/lib/minio/src/main/asciidoc/resources/design-sketch.pptx
+++ b/modules/lib/minio/src/main/asciidoc/resources/design-sketch.pptx
@@ -261,7 +261,7 @@
           <a:p>
             <a:fld id="{4ABBF570-B5A3-4C1B-9C5A-286BC455873B}" type="datetimeFigureOut">
               <a:rPr lang="en-GB" smtClean="0"/>
-              <a:t>24/07/2018</a:t>
+              <a:t>25/07/2018</a:t>
             </a:fld>
             <a:endParaRPr lang="en-GB"/>
           </a:p>
@@ -461,7 +461,7 @@
           <a:p>
             <a:fld id="{4ABBF570-B5A3-4C1B-9C5A-286BC455873B}" type="datetimeFigureOut">
               <a:rPr lang="en-GB" smtClean="0"/>
-              <a:t>24/07/2018</a:t>
+              <a:t>25/07/2018</a:t>
             </a:fld>
             <a:endParaRPr lang="en-GB"/>
           </a:p>
@@ -671,7 +671,7 @@
           <a:p>
             <a:fld id="{4ABBF570-B5A3-4C1B-9C5A-286BC455873B}" type="datetimeFigureOut">
               <a:rPr lang="en-GB" smtClean="0"/>
-              <a:t>24/07/2018</a:t>
+              <a:t>25/07/2018</a:t>
             </a:fld>
             <a:endParaRPr lang="en-GB"/>
           </a:p>
@@ -871,7 +871,7 @@
           <a:p>
             <a:fld id="{4ABBF570-B5A3-4C1B-9C5A-286BC455873B}" type="datetimeFigureOut">
               <a:rPr lang="en-GB" smtClean="0"/>
-              <a:t>24/07/2018</a:t>
+              <a:t>25/07/2018</a:t>
             </a:fld>
             <a:endParaRPr lang="en-GB"/>
           </a:p>
@@ -1147,7 +1147,7 @@
           <a:p>
             <a:fld id="{4ABBF570-B5A3-4C1B-9C5A-286BC455873B}" type="datetimeFigureOut">
               <a:rPr lang="en-GB" smtClean="0"/>
-              <a:t>24/07/2018</a:t>
+              <a:t>25/07/2018</a:t>
             </a:fld>
             <a:endParaRPr lang="en-GB"/>
           </a:p>
@@ -1415,7 +1415,7 @@
           <a:p>
             <a:fld id="{4ABBF570-B5A3-4C1B-9C5A-286BC455873B}" type="datetimeFigureOut">
               <a:rPr lang="en-GB" smtClean="0"/>
-              <a:t>24/07/2018</a:t>
+              <a:t>25/07/2018</a:t>
             </a:fld>
             <a:endParaRPr lang="en-GB"/>
           </a:p>
@@ -1830,7 +1830,7 @@
           <a:p>
             <a:fld id="{4ABBF570-B5A3-4C1B-9C5A-286BC455873B}" type="datetimeFigureOut">
               <a:rPr lang="en-GB" smtClean="0"/>
-              <a:t>24/07/2018</a:t>
+              <a:t>25/07/2018</a:t>
             </a:fld>
             <a:endParaRPr lang="en-GB"/>
           </a:p>
@@ -1972,7 +1972,7 @@
           <a:p>
             <a:fld id="{4ABBF570-B5A3-4C1B-9C5A-286BC455873B}" type="datetimeFigureOut">
               <a:rPr lang="en-GB" smtClean="0"/>
-              <a:t>24/07/2018</a:t>
+              <a:t>25/07/2018</a:t>
             </a:fld>
             <a:endParaRPr lang="en-GB"/>
           </a:p>
@@ -2085,7 +2085,7 @@
           <a:p>
             <a:fld id="{4ABBF570-B5A3-4C1B-9C5A-286BC455873B}" type="datetimeFigureOut">
               <a:rPr lang="en-GB" smtClean="0"/>
-              <a:t>24/07/2018</a:t>
+              <a:t>25/07/2018</a:t>
             </a:fld>
             <a:endParaRPr lang="en-GB"/>
           </a:p>
@@ -2398,7 +2398,7 @@
           <a:p>
             <a:fld id="{4ABBF570-B5A3-4C1B-9C5A-286BC455873B}" type="datetimeFigureOut">
               <a:rPr lang="en-GB" smtClean="0"/>
-              <a:t>24/07/2018</a:t>
+              <a:t>25/07/2018</a:t>
             </a:fld>
             <a:endParaRPr lang="en-GB"/>
           </a:p>
@@ -2687,7 +2687,7 @@
           <a:p>
             <a:fld id="{4ABBF570-B5A3-4C1B-9C5A-286BC455873B}" type="datetimeFigureOut">
               <a:rPr lang="en-GB" smtClean="0"/>
-              <a:t>24/07/2018</a:t>
+              <a:t>25/07/2018</a:t>
             </a:fld>
             <a:endParaRPr lang="en-GB"/>
           </a:p>
@@ -2930,7 +2930,7 @@
           <a:p>
             <a:fld id="{4ABBF570-B5A3-4C1B-9C5A-286BC455873B}" type="datetimeFigureOut">
               <a:rPr lang="en-GB" smtClean="0"/>
-              <a:t>24/07/2018</a:t>
+              <a:t>25/07/2018</a:t>
             </a:fld>
             <a:endParaRPr lang="en-GB"/>
           </a:p>
@@ -3361,8 +3361,8 @@
         </p:nvSpPr>
         <p:spPr>
           <a:xfrm>
-            <a:off x="1424193" y="3547230"/>
-            <a:ext cx="7969794" cy="3059626"/>
+            <a:off x="2345631" y="3547230"/>
+            <a:ext cx="7738342" cy="3059626"/>
           </a:xfrm>
           <a:prstGeom prst="rect">
             <a:avLst/>
@@ -3410,12 +3410,15 @@
         </p:nvSpPr>
         <p:spPr>
           <a:xfrm>
-            <a:off x="1719931" y="3732772"/>
-            <a:ext cx="5057465" cy="2510542"/>
+            <a:off x="2641369" y="3732772"/>
+            <a:ext cx="5370648" cy="2291147"/>
           </a:xfrm>
           <a:prstGeom prst="rect">
             <a:avLst/>
           </a:prstGeom>
+          <a:ln>
+            <a:prstDash val="sysDot"/>
+          </a:ln>
         </p:spPr>
         <p:style>
           <a:lnRef idx="2">
@@ -3435,14 +3438,6 @@
           <a:bodyPr rtlCol="0" anchor="b" anchorCtr="0"/>
           <a:lstStyle/>
           <a:p>
-            <a:r>
-              <a:rPr lang="en-GB" dirty="0"/>
-              <a:t>Document Archiver  </a:t>
-            </a:r>
-            <a:r>
-              <a:rPr lang="en-GB"/>
-              <a:t>&amp; Access Tool</a:t>
-            </a:r>
             <a:endParaRPr lang="en-GB" dirty="0"/>
           </a:p>
         </p:txBody>
@@ -3461,7 +3456,7 @@
         </p:nvSpPr>
         <p:spPr>
           <a:xfrm>
-            <a:off x="628008" y="1021893"/>
+            <a:off x="1592613" y="1093067"/>
             <a:ext cx="2022390" cy="1648912"/>
           </a:xfrm>
           <a:prstGeom prst="rect">
@@ -3560,7 +3555,7 @@
         </p:nvSpPr>
         <p:spPr>
           <a:xfrm>
-            <a:off x="1185092" y="200169"/>
+            <a:off x="2149697" y="271343"/>
             <a:ext cx="908222" cy="654908"/>
           </a:xfrm>
           <a:prstGeom prst="flowChartMagneticDisk">
@@ -3696,7 +3691,7 @@
         </p:nvSpPr>
         <p:spPr>
           <a:xfrm>
-            <a:off x="3161989" y="5071420"/>
+            <a:off x="4083427" y="5071420"/>
             <a:ext cx="1514733" cy="737287"/>
           </a:xfrm>
           <a:prstGeom prst="rect">
@@ -3723,9 +3718,25 @@
           <a:p>
             <a:pPr algn="ctr"/>
             <a:r>
+              <a:rPr lang="en-GB" sz="1100" dirty="0"/>
+              <a:t>&lt;&lt;</a:t>
+            </a:r>
+            <a:r>
+              <a:rPr lang="en-GB" sz="1100" dirty="0" err="1"/>
+              <a:t>minioarchlib</a:t>
+            </a:r>
+            <a:r>
+              <a:rPr lang="en-GB" sz="1100" dirty="0"/>
+              <a:t>&gt;&gt;</a:t>
+            </a:r>
+            <a:br>
               <a:rPr lang="en-GB" dirty="0"/>
-              <a:t>Control</a:t>
-            </a:r>
+            </a:br>
+            <a:r>
+              <a:rPr lang="en-GB" dirty="0" err="1"/>
+              <a:t>MinioArchiver</a:t>
+            </a:r>
+            <a:endParaRPr lang="en-GB" dirty="0"/>
           </a:p>
         </p:txBody>
       </p:sp>
@@ -3743,7 +3754,7 @@
         </p:nvSpPr>
         <p:spPr>
           <a:xfrm>
-            <a:off x="1907599" y="3897525"/>
+            <a:off x="2829037" y="3897525"/>
             <a:ext cx="1514733" cy="737287"/>
           </a:xfrm>
           <a:prstGeom prst="rect">
@@ -3794,7 +3805,7 @@
         </p:nvSpPr>
         <p:spPr>
           <a:xfrm>
-            <a:off x="4772070" y="3870564"/>
+            <a:off x="6326325" y="3911160"/>
             <a:ext cx="1514733" cy="737287"/>
           </a:xfrm>
           <a:prstGeom prst="rect">
@@ -3851,8 +3862,8 @@
         </p:nvCxnSpPr>
         <p:spPr>
           <a:xfrm rot="5400000" flipH="1" flipV="1">
-            <a:off x="3929607" y="4228957"/>
-            <a:ext cx="832212" cy="852714"/>
+            <a:off x="5187751" y="3932847"/>
+            <a:ext cx="791616" cy="1485531"/>
           </a:xfrm>
           <a:prstGeom prst="curvedConnector2">
             <a:avLst/>
@@ -3894,8 +3905,8 @@
         </p:nvCxnSpPr>
         <p:spPr>
           <a:xfrm rot="5400000" flipH="1" flipV="1">
-            <a:off x="5894892" y="2472911"/>
-            <a:ext cx="1032198" cy="1763109"/>
+            <a:off x="6651722" y="3270336"/>
+            <a:ext cx="1072794" cy="208854"/>
           </a:xfrm>
           <a:prstGeom prst="curvedConnector2">
             <a:avLst/>
@@ -3937,7 +3948,7 @@
         </p:nvCxnSpPr>
         <p:spPr>
           <a:xfrm rot="16200000" flipV="1">
-            <a:off x="3268219" y="4420283"/>
+            <a:off x="4189657" y="4420283"/>
             <a:ext cx="805251" cy="497024"/>
           </a:xfrm>
           <a:prstGeom prst="curvedConnector2">
@@ -3976,8 +3987,8 @@
         </p:nvSpPr>
         <p:spPr>
           <a:xfrm>
-            <a:off x="4002115" y="4002805"/>
-            <a:ext cx="654218" cy="276999"/>
+            <a:off x="5002658" y="3989169"/>
+            <a:ext cx="1284582" cy="276999"/>
           </a:xfrm>
           <a:prstGeom prst="rect">
             <a:avLst/>
@@ -3992,7 +4003,15 @@
           <a:p>
             <a:r>
               <a:rPr lang="en-GB" sz="1200" dirty="0"/>
-              <a:t>2: fetch</a:t>
+              <a:t>2: </a:t>
+            </a:r>
+            <a:r>
+              <a:rPr lang="en-GB" sz="1200" dirty="0" err="1"/>
+              <a:t>findToArchive</a:t>
+            </a:r>
+            <a:r>
+              <a:rPr lang="en-GB" sz="1200" dirty="0"/>
+              <a:t>()</a:t>
             </a:r>
           </a:p>
         </p:txBody>
@@ -4011,8 +4030,8 @@
         </p:nvSpPr>
         <p:spPr>
           <a:xfrm>
-            <a:off x="7546375" y="5071420"/>
-            <a:ext cx="1514733" cy="737287"/>
+            <a:off x="8682411" y="5520028"/>
+            <a:ext cx="1146655" cy="436896"/>
           </a:xfrm>
           <a:prstGeom prst="rect">
             <a:avLst/>
@@ -4062,8 +4081,8 @@
         </p:nvCxnSpPr>
         <p:spPr>
           <a:xfrm rot="10800000">
-            <a:off x="6777397" y="4988044"/>
-            <a:ext cx="768979" cy="452021"/>
+            <a:off x="8012017" y="4878346"/>
+            <a:ext cx="670394" cy="860130"/>
           </a:xfrm>
           <a:prstGeom prst="curvedConnector3">
             <a:avLst>
@@ -4103,8 +4122,8 @@
         </p:nvSpPr>
         <p:spPr>
           <a:xfrm>
-            <a:off x="6902810" y="5320077"/>
-            <a:ext cx="263214" cy="276999"/>
+            <a:off x="8359962" y="5146852"/>
+            <a:ext cx="1064843" cy="276999"/>
           </a:xfrm>
           <a:prstGeom prst="rect">
             <a:avLst/>
@@ -4119,7 +4138,7 @@
           <a:p>
             <a:r>
               <a:rPr lang="en-GB" sz="1200" dirty="0"/>
-              <a:t>1</a:t>
+              <a:t>1 (every hour)</a:t>
             </a:r>
           </a:p>
         </p:txBody>
@@ -4138,7 +4157,7 @@
         </p:nvSpPr>
         <p:spPr>
           <a:xfrm>
-            <a:off x="4922937" y="2856986"/>
+            <a:off x="5502823" y="2932306"/>
             <a:ext cx="1284582" cy="276999"/>
           </a:xfrm>
           <a:prstGeom prst="rect">
@@ -4181,8 +4200,8 @@
         </p:nvSpPr>
         <p:spPr>
           <a:xfrm>
-            <a:off x="2792237" y="4669488"/>
-            <a:ext cx="697627" cy="276999"/>
+            <a:off x="3713675" y="4669488"/>
+            <a:ext cx="771365" cy="276999"/>
           </a:xfrm>
           <a:prstGeom prst="rect">
             <a:avLst/>
@@ -4197,7 +4216,7 @@
           <a:p>
             <a:r>
               <a:rPr lang="en-GB" sz="1200" dirty="0"/>
-              <a:t>4: insert</a:t>
+              <a:t>4: upload</a:t>
             </a:r>
           </a:p>
         </p:txBody>
@@ -4220,8 +4239,8 @@
         </p:nvCxnSpPr>
         <p:spPr>
           <a:xfrm rot="16200000" flipV="1">
-            <a:off x="1538725" y="2771283"/>
-            <a:ext cx="1226720" cy="1025763"/>
+            <a:off x="2517333" y="2828454"/>
+            <a:ext cx="1155546" cy="982596"/>
           </a:xfrm>
           <a:prstGeom prst="curvedConnector3">
             <a:avLst>
@@ -4261,7 +4280,7 @@
         </p:nvSpPr>
         <p:spPr>
           <a:xfrm>
-            <a:off x="1960182" y="2941112"/>
+            <a:off x="3615003" y="2962197"/>
             <a:ext cx="1536874" cy="276999"/>
           </a:xfrm>
           <a:prstGeom prst="rect">
@@ -4277,7 +4296,7 @@
           <a:p>
             <a:r>
               <a:rPr lang="en-GB" sz="1200" dirty="0"/>
-              <a:t>5: insert (</a:t>
+              <a:t>5: upload (</a:t>
             </a:r>
             <a:r>
               <a:rPr lang="en-GB" sz="1200" dirty="0" err="1"/>
@@ -4308,8 +4327,8 @@
         </p:nvCxnSpPr>
         <p:spPr>
           <a:xfrm flipV="1">
-            <a:off x="6286803" y="3005182"/>
-            <a:ext cx="2016938" cy="1234026"/>
+            <a:off x="7841058" y="3005182"/>
+            <a:ext cx="462683" cy="1274622"/>
           </a:xfrm>
           <a:prstGeom prst="curvedConnector2">
             <a:avLst/>
@@ -4347,7 +4366,7 @@
         </p:nvSpPr>
         <p:spPr>
           <a:xfrm>
-            <a:off x="7456796" y="3908732"/>
+            <a:off x="8264758" y="3282406"/>
             <a:ext cx="1085041" cy="276999"/>
           </a:xfrm>
           <a:prstGeom prst="rect">
@@ -4394,8 +4413,8 @@
         </p:nvCxnSpPr>
         <p:spPr>
           <a:xfrm flipV="1">
-            <a:off x="4676722" y="4607851"/>
-            <a:ext cx="852715" cy="832213"/>
+            <a:off x="5598160" y="4648447"/>
+            <a:ext cx="1485532" cy="791617"/>
           </a:xfrm>
           <a:prstGeom prst="curvedConnector2">
             <a:avLst/>
@@ -4433,8 +4452,8 @@
         </p:nvSpPr>
         <p:spPr>
           <a:xfrm>
-            <a:off x="5417957" y="4968708"/>
-            <a:ext cx="779509" cy="276999"/>
+            <a:off x="6376507" y="5301563"/>
+            <a:ext cx="1085041" cy="276999"/>
           </a:xfrm>
           <a:prstGeom prst="rect">
             <a:avLst/>
@@ -4449,7 +4468,15 @@
           <a:p>
             <a:r>
               <a:rPr lang="en-GB" sz="1200" dirty="0"/>
-              <a:t>6: update</a:t>
+              <a:t>6: archive (</a:t>
+            </a:r>
+            <a:r>
+              <a:rPr lang="en-GB" sz="1200" dirty="0" err="1"/>
+              <a:t>xN</a:t>
+            </a:r>
+            <a:r>
+              <a:rPr lang="en-GB" sz="1200" dirty="0"/>
+              <a:t>)</a:t>
             </a:r>
           </a:p>
         </p:txBody>
@@ -4468,8 +4495,8 @@
         </p:nvSpPr>
         <p:spPr>
           <a:xfrm>
-            <a:off x="9973770" y="3501920"/>
-            <a:ext cx="2022390" cy="1105931"/>
+            <a:off x="10405182" y="3501921"/>
+            <a:ext cx="1590978" cy="737288"/>
           </a:xfrm>
           <a:prstGeom prst="rect">
             <a:avLst/>
@@ -4519,8 +4546,8 @@
         </p:nvCxnSpPr>
         <p:spPr>
           <a:xfrm rot="16200000" flipV="1">
-            <a:off x="9820434" y="2337389"/>
-            <a:ext cx="1439567" cy="889496"/>
+            <a:off x="9928286" y="2229536"/>
+            <a:ext cx="1439568" cy="1105202"/>
           </a:xfrm>
           <a:prstGeom prst="curvedConnector2">
             <a:avLst/>
@@ -4562,8 +4589,8 @@
         </p:nvCxnSpPr>
         <p:spPr>
           <a:xfrm rot="10800000">
-            <a:off x="2650398" y="1846349"/>
-            <a:ext cx="4642148" cy="216004"/>
+            <a:off x="3615004" y="1917523"/>
+            <a:ext cx="3677543" cy="144830"/>
           </a:xfrm>
           <a:prstGeom prst="curvedConnector3">
             <a:avLst>
@@ -4644,7 +4671,7 @@
         </p:nvSpPr>
         <p:spPr>
           <a:xfrm>
-            <a:off x="4839865" y="1680366"/>
+            <a:off x="5466553" y="1721719"/>
             <a:ext cx="263214" cy="276999"/>
           </a:xfrm>
           <a:prstGeom prst="rect">
@@ -4925,6 +4952,146 @@
           </a:fontRef>
         </p:style>
       </p:cxnSp>
+      <p:sp>
+        <p:nvSpPr>
+          <p:cNvPr id="38" name="Rectangle 37">
+            <a:extLst>
+              <a:ext uri="{FF2B5EF4-FFF2-40B4-BE49-F238E27FC236}">
+                <a16:creationId xmlns:a16="http://schemas.microsoft.com/office/drawing/2014/main" id="{E7B2C70C-218B-4423-8981-5724E5D5A114}"/>
+              </a:ext>
+            </a:extLst>
+          </p:cNvPr>
+          <p:cNvSpPr/>
+          <p:nvPr/>
+        </p:nvSpPr>
+        <p:spPr>
+          <a:xfrm>
+            <a:off x="235949" y="3753874"/>
+            <a:ext cx="1514733" cy="737287"/>
+          </a:xfrm>
+          <a:prstGeom prst="rect">
+            <a:avLst/>
+          </a:prstGeom>
+        </p:spPr>
+        <p:style>
+          <a:lnRef idx="2">
+            <a:schemeClr val="accent1"/>
+          </a:lnRef>
+          <a:fillRef idx="1">
+            <a:schemeClr val="lt1"/>
+          </a:fillRef>
+          <a:effectRef idx="0">
+            <a:schemeClr val="accent1"/>
+          </a:effectRef>
+          <a:fontRef idx="minor">
+            <a:schemeClr val="dk1"/>
+          </a:fontRef>
+        </p:style>
+        <p:txBody>
+          <a:bodyPr rtlCol="0" anchor="ctr"/>
+          <a:lstStyle/>
+          <a:p>
+            <a:pPr algn="ctr"/>
+            <a:r>
+              <a:rPr lang="en-GB" sz="1100" dirty="0"/>
+              <a:t>&lt;&lt;</a:t>
+            </a:r>
+            <a:r>
+              <a:rPr lang="en-GB" sz="1100" dirty="0" err="1"/>
+              <a:t>minioarchtool</a:t>
+            </a:r>
+            <a:r>
+              <a:rPr lang="en-GB" sz="1100" dirty="0"/>
+              <a:t>&gt;&gt;</a:t>
+            </a:r>
+          </a:p>
+          <a:p>
+            <a:pPr algn="ctr"/>
+            <a:r>
+              <a:rPr lang="en-GB" dirty="0"/>
+              <a:t>Main</a:t>
+            </a:r>
+          </a:p>
+        </p:txBody>
+      </p:sp>
+      <p:cxnSp>
+        <p:nvCxnSpPr>
+          <p:cNvPr id="44" name="Connector: Curved 43">
+            <a:extLst>
+              <a:ext uri="{FF2B5EF4-FFF2-40B4-BE49-F238E27FC236}">
+                <a16:creationId xmlns:a16="http://schemas.microsoft.com/office/drawing/2014/main" id="{2674850A-6166-4E9A-BF5E-FC18EF6B5169}"/>
+              </a:ext>
+            </a:extLst>
+          </p:cNvPr>
+          <p:cNvCxnSpPr>
+            <a:cxnSpLocks/>
+            <a:stCxn id="38" idx="2"/>
+            <a:endCxn id="9" idx="1"/>
+          </p:cNvCxnSpPr>
+          <p:nvPr/>
+        </p:nvCxnSpPr>
+        <p:spPr>
+          <a:xfrm rot="16200000" flipH="1">
+            <a:off x="2063920" y="3420556"/>
+            <a:ext cx="948903" cy="3090111"/>
+          </a:xfrm>
+          <a:prstGeom prst="curvedConnector2">
+            <a:avLst/>
+          </a:prstGeom>
+          <a:ln>
+            <a:tailEnd type="triangle"/>
+          </a:ln>
+        </p:spPr>
+        <p:style>
+          <a:lnRef idx="1">
+            <a:schemeClr val="accent1"/>
+          </a:lnRef>
+          <a:fillRef idx="0">
+            <a:schemeClr val="accent1"/>
+          </a:fillRef>
+          <a:effectRef idx="0">
+            <a:schemeClr val="accent1"/>
+          </a:effectRef>
+          <a:fontRef idx="minor">
+            <a:schemeClr val="tx1"/>
+          </a:fontRef>
+        </p:style>
+      </p:cxnSp>
+      <p:sp>
+        <p:nvSpPr>
+          <p:cNvPr id="47" name="TextBox 46">
+            <a:extLst>
+              <a:ext uri="{FF2B5EF4-FFF2-40B4-BE49-F238E27FC236}">
+                <a16:creationId xmlns:a16="http://schemas.microsoft.com/office/drawing/2014/main" id="{205F37BE-F220-4041-BC90-A25011616F4F}"/>
+              </a:ext>
+            </a:extLst>
+          </p:cNvPr>
+          <p:cNvSpPr txBox="1"/>
+          <p:nvPr/>
+        </p:nvSpPr>
+        <p:spPr>
+          <a:xfrm>
+            <a:off x="570261" y="5092522"/>
+            <a:ext cx="1416029" cy="276999"/>
+          </a:xfrm>
+          <a:prstGeom prst="rect">
+            <a:avLst/>
+          </a:prstGeom>
+          <a:noFill/>
+        </p:spPr>
+        <p:txBody>
+          <a:bodyPr wrap="none" rtlCol="0">
+            <a:spAutoFit/>
+          </a:bodyPr>
+          <a:lstStyle/>
+          <a:p>
+            <a:r>
+              <a:rPr lang="en-GB" sz="1200" dirty="0"/>
+              <a:t>0: (initial migration)</a:t>
+            </a:r>
+          </a:p>
+        </p:txBody>
+      </p:sp>
     </p:spTree>
     <p:extLst>
       <p:ext uri="{BB962C8B-B14F-4D97-AF65-F5344CB8AC3E}">

</xml_diff>

<commit_message>
#91: fixes serialization issue
</commit_message>
<xml_diff>
--- a/modules/lib/minio/src/main/asciidoc/resources/design-sketch.pptx
+++ b/modules/lib/minio/src/main/asciidoc/resources/design-sketch.pptx
@@ -3411,7 +3411,7 @@
         <p:spPr>
           <a:xfrm>
             <a:off x="2641369" y="3732772"/>
-            <a:ext cx="5370648" cy="2291147"/>
+            <a:ext cx="5370648" cy="2501212"/>
           </a:xfrm>
           <a:prstGeom prst="rect">
             <a:avLst/>
@@ -3438,6 +3438,10 @@
           <a:bodyPr rtlCol="0" anchor="b" anchorCtr="0"/>
           <a:lstStyle/>
           <a:p>
+            <a:r>
+              <a:rPr lang="en-GB" dirty="0" err="1"/>
+              <a:t>MinioArchiverProcessor</a:t>
+            </a:r>
             <a:endParaRPr lang="en-GB" dirty="0"/>
           </a:p>
         </p:txBody>
@@ -4081,8 +4085,8 @@
         </p:nvCxnSpPr>
         <p:spPr>
           <a:xfrm rot="10800000">
-            <a:off x="8012017" y="4878346"/>
-            <a:ext cx="670394" cy="860130"/>
+            <a:off x="8012017" y="4983378"/>
+            <a:ext cx="670394" cy="755098"/>
           </a:xfrm>
           <a:prstGeom prst="curvedConnector3">
             <a:avLst>

</xml_diff>